<commit_message>
added spice download link to presentation
</commit_message>
<xml_diff>
--- a/spice_overview.pptx
+++ b/spice_overview.pptx
@@ -5145,9 +5145,29 @@
         </p:nvSpPr>
         <p:spPr/>
         <p:txBody>
-          <a:bodyPr/>
-          <a:lstStyle/>
-          <a:p>
+          <a:bodyPr>
+            <a:normAutofit lnSpcReduction="10000"/>
+          </a:bodyPr>
+          <a:lstStyle/>
+          <a:p>
+            <a:r>
+              <a:rPr lang="en-US" dirty="0"/>
+              <a:t>Chris Gnam</a:t>
+            </a:r>
+          </a:p>
+          <a:p>
+            <a:r>
+              <a:rPr lang="en-US" dirty="0" err="1"/>
+              <a:t>crgnam@</a:t>
+            </a:r>
+            <a:r>
+              <a:rPr lang="en-US" err="1"/>
+              <a:t>buffalo</a:t>
+            </a:r>
+            <a:r>
+              <a:rPr lang="en-US"/>
+              <a:t>.edu</a:t>
+            </a:r>
             <a:endParaRPr lang="en-US" dirty="0"/>
           </a:p>
         </p:txBody>
@@ -5967,7 +5987,7 @@
         <p:spPr/>
         <p:txBody>
           <a:bodyPr>
-            <a:normAutofit fontScale="92500" lnSpcReduction="10000"/>
+            <a:normAutofit fontScale="85000" lnSpcReduction="20000"/>
           </a:bodyPr>
           <a:lstStyle/>
           <a:p>
@@ -6049,11 +6069,27 @@
           <a:p>
             <a:r>
               <a:rPr lang="en-US" dirty="0"/>
-              <a:t>Great overview documentation can be found at: </a:t>
+              <a:t>SPICE Download Available here:  </a:t>
             </a:r>
             <a:r>
               <a:rPr lang="en-US" dirty="0">
                 <a:hlinkClick r:id="rId2"/>
+              </a:rPr>
+              <a:t>https://naif.jpl.nasa.gov/naif/toolkit.html</a:t>
+            </a:r>
+            <a:endParaRPr lang="en-US" dirty="0"/>
+          </a:p>
+          <a:p>
+            <a:endParaRPr lang="en-US" dirty="0"/>
+          </a:p>
+          <a:p>
+            <a:r>
+              <a:rPr lang="en-US" dirty="0"/>
+              <a:t>Great overview documentation can be found at: </a:t>
+            </a:r>
+            <a:r>
+              <a:rPr lang="en-US" dirty="0">
+                <a:hlinkClick r:id="rId3"/>
               </a:rPr>
               <a:t>https://naif.jpl.nasa.gov/pub/naif/toolkit_docs/Tutorials/pdf/individual_docs/</a:t>
             </a:r>
@@ -7105,13 +7141,8 @@
           <a:p>
             <a:r>
               <a:rPr lang="en-US" dirty="0"/>
-              <a:t>Many data products (especially images and LiDAR data) will come with associated SPICE kernels.  For example any NAC images from the LRO have an associated SPICE kernel defining where the camera was and how it was pointed while capturing </a:t>
-            </a:r>
-            <a:r>
-              <a:rPr lang="en-US"/>
-              <a:t>the image.</a:t>
-            </a:r>
-            <a:endParaRPr lang="en-US" dirty="0"/>
+              <a:t>Many data products (especially images and LiDAR data) will come with associated SPICE kernels.  For example any NAC images from the LRO have an associated SPICE kernel defining where the camera was and how it was pointed while capturing the image.</a:t>
+            </a:r>
           </a:p>
         </p:txBody>
       </p:sp>

</xml_diff>